<commit_message>
Update Intel plugfest preparation presentations
Include diagram of planned configuration.
</commit_message>
<xml_diff>
--- a/plugfest/2018-bundang/Intel-Bundang-PlugFest-Preparation.pptx
+++ b/plugfest/2018-bundang/Intel-Bundang-PlugFest-Preparation.pptx
@@ -8,8 +8,9 @@
     <p:sldId id="256" r:id="rId2"/>
     <p:sldId id="258" r:id="rId3"/>
     <p:sldId id="259" r:id="rId4"/>
-    <p:sldId id="260" r:id="rId5"/>
-    <p:sldId id="261" r:id="rId6"/>
+    <p:sldId id="262" r:id="rId5"/>
+    <p:sldId id="260" r:id="rId6"/>
+    <p:sldId id="261" r:id="rId7"/>
   </p:sldIdLst>
   <p:sldSz cx="9144000" cy="6858000" type="screen4x3"/>
   <p:notesSz cx="6858000" cy="9144000"/>
@@ -309,7 +310,7 @@
             <a:fld id="{1EFAB2E7-15A8-48F2-861E-A5AFD18AE688}" type="datetimeFigureOut">
               <a:rPr lang="de-DE" smtClean="0"/>
               <a:pPr/>
-              <a:t>30.05.2018</a:t>
+              <a:t>05.06.2018</a:t>
             </a:fld>
             <a:endParaRPr lang="de-DE"/>
           </a:p>
@@ -476,7 +477,7 @@
             <a:fld id="{1EFAB2E7-15A8-48F2-861E-A5AFD18AE688}" type="datetimeFigureOut">
               <a:rPr lang="de-DE" smtClean="0"/>
               <a:pPr/>
-              <a:t>30.05.2018</a:t>
+              <a:t>05.06.2018</a:t>
             </a:fld>
             <a:endParaRPr lang="de-DE"/>
           </a:p>
@@ -653,7 +654,7 @@
             <a:fld id="{1EFAB2E7-15A8-48F2-861E-A5AFD18AE688}" type="datetimeFigureOut">
               <a:rPr lang="de-DE" smtClean="0"/>
               <a:pPr/>
-              <a:t>30.05.2018</a:t>
+              <a:t>05.06.2018</a:t>
             </a:fld>
             <a:endParaRPr lang="de-DE"/>
           </a:p>
@@ -820,7 +821,7 @@
             <a:fld id="{1EFAB2E7-15A8-48F2-861E-A5AFD18AE688}" type="datetimeFigureOut">
               <a:rPr lang="de-DE" smtClean="0"/>
               <a:pPr/>
-              <a:t>30.05.2018</a:t>
+              <a:t>05.06.2018</a:t>
             </a:fld>
             <a:endParaRPr lang="de-DE"/>
           </a:p>
@@ -1063,7 +1064,7 @@
             <a:fld id="{1EFAB2E7-15A8-48F2-861E-A5AFD18AE688}" type="datetimeFigureOut">
               <a:rPr lang="de-DE" smtClean="0"/>
               <a:pPr/>
-              <a:t>30.05.2018</a:t>
+              <a:t>05.06.2018</a:t>
             </a:fld>
             <a:endParaRPr lang="de-DE"/>
           </a:p>
@@ -1348,7 +1349,7 @@
             <a:fld id="{1EFAB2E7-15A8-48F2-861E-A5AFD18AE688}" type="datetimeFigureOut">
               <a:rPr lang="de-DE" smtClean="0"/>
               <a:pPr/>
-              <a:t>30.05.2018</a:t>
+              <a:t>05.06.2018</a:t>
             </a:fld>
             <a:endParaRPr lang="de-DE"/>
           </a:p>
@@ -1767,7 +1768,7 @@
             <a:fld id="{1EFAB2E7-15A8-48F2-861E-A5AFD18AE688}" type="datetimeFigureOut">
               <a:rPr lang="de-DE" smtClean="0"/>
               <a:pPr/>
-              <a:t>30.05.2018</a:t>
+              <a:t>05.06.2018</a:t>
             </a:fld>
             <a:endParaRPr lang="de-DE"/>
           </a:p>
@@ -1882,7 +1883,7 @@
             <a:fld id="{1EFAB2E7-15A8-48F2-861E-A5AFD18AE688}" type="datetimeFigureOut">
               <a:rPr lang="de-DE" smtClean="0"/>
               <a:pPr/>
-              <a:t>30.05.2018</a:t>
+              <a:t>05.06.2018</a:t>
             </a:fld>
             <a:endParaRPr lang="de-DE"/>
           </a:p>
@@ -1974,7 +1975,7 @@
             <a:fld id="{1EFAB2E7-15A8-48F2-861E-A5AFD18AE688}" type="datetimeFigureOut">
               <a:rPr lang="de-DE" smtClean="0"/>
               <a:pPr/>
-              <a:t>30.05.2018</a:t>
+              <a:t>05.06.2018</a:t>
             </a:fld>
             <a:endParaRPr lang="de-DE"/>
           </a:p>
@@ -2248,7 +2249,7 @@
             <a:fld id="{1EFAB2E7-15A8-48F2-861E-A5AFD18AE688}" type="datetimeFigureOut">
               <a:rPr lang="de-DE" smtClean="0"/>
               <a:pPr/>
-              <a:t>30.05.2018</a:t>
+              <a:t>05.06.2018</a:t>
             </a:fld>
             <a:endParaRPr lang="de-DE"/>
           </a:p>
@@ -2498,7 +2499,7 @@
             <a:fld id="{1EFAB2E7-15A8-48F2-861E-A5AFD18AE688}" type="datetimeFigureOut">
               <a:rPr lang="de-DE" smtClean="0"/>
               <a:pPr/>
-              <a:t>30.05.2018</a:t>
+              <a:t>05.06.2018</a:t>
             </a:fld>
             <a:endParaRPr lang="de-DE"/>
           </a:p>
@@ -2708,7 +2709,7 @@
             <a:fld id="{1EFAB2E7-15A8-48F2-861E-A5AFD18AE688}" type="datetimeFigureOut">
               <a:rPr lang="de-DE" smtClean="0"/>
               <a:pPr/>
-              <a:t>30.05.2018</a:t>
+              <a:t>05.06.2018</a:t>
             </a:fld>
             <a:endParaRPr lang="de-DE"/>
           </a:p>
@@ -3227,8 +3228,8 @@
         </p:nvSpPr>
         <p:spPr>
           <a:xfrm>
-            <a:off x="457200" y="1600200"/>
-            <a:ext cx="8229600" cy="4925144"/>
+            <a:off x="457200" y="1268760"/>
+            <a:ext cx="8229600" cy="5256584"/>
           </a:xfrm>
         </p:spPr>
         <p:txBody>
@@ -3263,14 +3264,12 @@
               <a:rPr lang="en-US" dirty="0" smtClean="0"/>
               <a:t> by translating existing metadata</a:t>
             </a:r>
-            <a:endParaRPr lang="en-US" dirty="0" smtClean="0"/>
           </a:p>
           <a:p>
             <a:r>
               <a:rPr lang="en-US" dirty="0" smtClean="0"/>
               <a:t>Bridge multiple ecosystems</a:t>
             </a:r>
-            <a:endParaRPr lang="en-US" dirty="0" smtClean="0"/>
           </a:p>
           <a:p>
             <a:pPr lvl="1"/>
@@ -3278,6 +3277,13 @@
               <a:rPr lang="en-US" dirty="0" smtClean="0"/>
               <a:t>OCF, web services, node-wot based Things</a:t>
             </a:r>
+          </a:p>
+          <a:p>
+            <a:r>
+              <a:rPr lang="en-US" smtClean="0"/>
+              <a:t>NAT Traversal</a:t>
+            </a:r>
+            <a:endParaRPr lang="en-US" dirty="0" smtClean="0"/>
           </a:p>
           <a:p>
             <a:r>
@@ -3402,9 +3408,9 @@
       </p:sp>
       <p:pic>
         <p:nvPicPr>
-          <p:cNvPr id="1026" name="Picture 2" descr="https://raw.githubusercontent.com/w3c/wot/master/testing/online/IMAGES/intel_architecture.png"/>
+          <p:cNvPr id="3" name="Picture 2"/>
           <p:cNvPicPr>
-            <a:picLocks noChangeAspect="1" noChangeArrowheads="1"/>
+            <a:picLocks noChangeAspect="1"/>
           </p:cNvPicPr>
           <p:nvPr/>
         </p:nvPicPr>
@@ -3416,29 +3422,18 @@
               </a:ext>
             </a:extLst>
           </a:blip>
-          <a:srcRect/>
           <a:stretch>
             <a:fillRect/>
           </a:stretch>
         </p:blipFill>
-        <p:spPr bwMode="auto">
+        <p:spPr>
           <a:xfrm>
-            <a:off x="362762" y="1700808"/>
-            <a:ext cx="8418475" cy="4535909"/>
+            <a:off x="296652" y="1268760"/>
+            <a:ext cx="8550696" cy="4607150"/>
           </a:xfrm>
           <a:prstGeom prst="rect">
             <a:avLst/>
           </a:prstGeom>
-          <a:noFill/>
-          <a:extLst>
-            <a:ext uri="{909E8E84-426E-40DD-AFC4-6F175D3DCCD1}">
-              <a14:hiddenFill xmlns:a14="http://schemas.microsoft.com/office/drawing/2010/main">
-                <a:solidFill>
-                  <a:srgbClr val="FFFFFF"/>
-                </a:solidFill>
-              </a14:hiddenFill>
-            </a:ext>
-          </a:extLst>
         </p:spPr>
       </p:pic>
     </p:spTree>
@@ -3488,6 +3483,93 @@
           <a:p>
             <a:r>
               <a:rPr lang="en-US" dirty="0" smtClean="0"/>
+              <a:t>Planned </a:t>
+            </a:r>
+            <a:r>
+              <a:rPr lang="en-US" dirty="0" smtClean="0"/>
+              <a:t>Architecture</a:t>
+            </a:r>
+            <a:endParaRPr lang="en-US" dirty="0"/>
+          </a:p>
+        </p:txBody>
+      </p:sp>
+      <p:pic>
+        <p:nvPicPr>
+          <p:cNvPr id="3" name="Picture 2"/>
+          <p:cNvPicPr>
+            <a:picLocks noChangeAspect="1"/>
+          </p:cNvPicPr>
+          <p:nvPr/>
+        </p:nvPicPr>
+        <p:blipFill>
+          <a:blip r:embed="rId2">
+            <a:extLst>
+              <a:ext uri="{28A0092B-C50C-407E-A947-70E740481C1C}">
+                <a14:useLocalDpi xmlns:a14="http://schemas.microsoft.com/office/drawing/2010/main" val="0"/>
+              </a:ext>
+            </a:extLst>
+          </a:blip>
+          <a:stretch>
+            <a:fillRect/>
+          </a:stretch>
+        </p:blipFill>
+        <p:spPr>
+          <a:xfrm>
+            <a:off x="377788" y="1268760"/>
+            <a:ext cx="8388424" cy="4519717"/>
+          </a:xfrm>
+          <a:prstGeom prst="rect">
+            <a:avLst/>
+          </a:prstGeom>
+        </p:spPr>
+      </p:pic>
+    </p:spTree>
+    <p:extLst>
+      <p:ext uri="{BB962C8B-B14F-4D97-AF65-F5344CB8AC3E}">
+        <p14:creationId xmlns:p14="http://schemas.microsoft.com/office/powerpoint/2010/main" val="3779862711"/>
+      </p:ext>
+    </p:extLst>
+  </p:cSld>
+  <p:clrMapOvr>
+    <a:masterClrMapping/>
+  </p:clrMapOvr>
+</p:sld>
+</file>
+
+<file path=ppt/slides/slide5.xml><?xml version="1.0" encoding="utf-8"?>
+<p:sld xmlns:a="http://schemas.openxmlformats.org/drawingml/2006/main" xmlns:r="http://schemas.openxmlformats.org/officeDocument/2006/relationships" xmlns:p="http://schemas.openxmlformats.org/presentationml/2006/main">
+  <p:cSld>
+    <p:spTree>
+      <p:nvGrpSpPr>
+        <p:cNvPr id="1" name=""/>
+        <p:cNvGrpSpPr/>
+        <p:nvPr/>
+      </p:nvGrpSpPr>
+      <p:grpSpPr>
+        <a:xfrm>
+          <a:off x="0" y="0"/>
+          <a:ext cx="0" cy="0"/>
+          <a:chOff x="0" y="0"/>
+          <a:chExt cx="0" cy="0"/>
+        </a:xfrm>
+      </p:grpSpPr>
+      <p:sp>
+        <p:nvSpPr>
+          <p:cNvPr id="2" name="Title 1"/>
+          <p:cNvSpPr>
+            <a:spLocks noGrp="1"/>
+          </p:cNvSpPr>
+          <p:nvPr>
+            <p:ph type="title"/>
+          </p:nvPr>
+        </p:nvSpPr>
+        <p:spPr/>
+        <p:txBody>
+          <a:bodyPr/>
+          <a:lstStyle/>
+          <a:p>
+            <a:r>
+              <a:rPr lang="en-US" dirty="0" smtClean="0"/>
               <a:t>To Do</a:t>
             </a:r>
             <a:endParaRPr lang="en-US" dirty="0"/>
@@ -3589,7 +3671,7 @@
 </p:sld>
 </file>
 
-<file path=ppt/slides/slide5.xml><?xml version="1.0" encoding="utf-8"?>
+<file path=ppt/slides/slide6.xml><?xml version="1.0" encoding="utf-8"?>
 <p:sld xmlns:a="http://schemas.openxmlformats.org/drawingml/2006/main" xmlns:r="http://schemas.openxmlformats.org/officeDocument/2006/relationships" xmlns:p="http://schemas.openxmlformats.org/presentationml/2006/main">
   <p:cSld>
     <p:spTree>

</xml_diff>